<commit_message>
Done with teaching W9S2, finalizing W9S3 with error messages, started W10S1 and W10S2.
</commit_message>
<xml_diff>
--- a/W9/W9S1/W9S1.pptx
+++ b/W9/W9S1/W9S1.pptx
@@ -4967,7 +4967,7 @@
   <pc:docChgLst>
     <pc:chgData name="Matthieu De Mari" userId="dfb708c9-d8dc-439f-9a3b-c772bf4a311c" providerId="ADAL" clId="{9C56ED94-FF08-4311-A90D-5831E9560329}"/>
     <pc:docChg chg="undo custSel addSld delSld modSld sldOrd addSection delSection modSection">
-      <pc:chgData name="Matthieu De Mari" userId="dfb708c9-d8dc-439f-9a3b-c772bf4a311c" providerId="ADAL" clId="{9C56ED94-FF08-4311-A90D-5831E9560329}" dt="2023-03-15T08:55:10.511" v="4302" actId="5793"/>
+      <pc:chgData name="Matthieu De Mari" userId="dfb708c9-d8dc-439f-9a3b-c772bf4a311c" providerId="ADAL" clId="{9C56ED94-FF08-4311-A90D-5831E9560329}" dt="2023-03-21T11:07:25.418" v="4314" actId="20577"/>
       <pc:docMkLst>
         <pc:docMk/>
       </pc:docMkLst>
@@ -5257,7 +5257,7 @@
         </pc:sldMkLst>
       </pc:sldChg>
       <pc:sldChg chg="delSp modSp add del mod">
-        <pc:chgData name="Matthieu De Mari" userId="dfb708c9-d8dc-439f-9a3b-c772bf4a311c" providerId="ADAL" clId="{9C56ED94-FF08-4311-A90D-5831E9560329}" dt="2023-03-15T08:33:25.545" v="3179"/>
+        <pc:chgData name="Matthieu De Mari" userId="dfb708c9-d8dc-439f-9a3b-c772bf4a311c" providerId="ADAL" clId="{9C56ED94-FF08-4311-A90D-5831E9560329}" dt="2023-03-21T10:27:40.065" v="4312" actId="115"/>
         <pc:sldMkLst>
           <pc:docMk/>
           <pc:sldMk cId="813445278" sldId="461"/>
@@ -5271,7 +5271,7 @@
           </ac:spMkLst>
         </pc:spChg>
         <pc:spChg chg="mod">
-          <ac:chgData name="Matthieu De Mari" userId="dfb708c9-d8dc-439f-9a3b-c772bf4a311c" providerId="ADAL" clId="{9C56ED94-FF08-4311-A90D-5831E9560329}" dt="2023-03-15T08:24:30.585" v="2833" actId="20577"/>
+          <ac:chgData name="Matthieu De Mari" userId="dfb708c9-d8dc-439f-9a3b-c772bf4a311c" providerId="ADAL" clId="{9C56ED94-FF08-4311-A90D-5831E9560329}" dt="2023-03-21T10:27:40.065" v="4312" actId="115"/>
           <ac:spMkLst>
             <pc:docMk/>
             <pc:sldMk cId="813445278" sldId="461"/>
@@ -5613,7 +5613,7 @@
         </pc:spChg>
       </pc:sldChg>
       <pc:sldChg chg="modSp add mod">
-        <pc:chgData name="Matthieu De Mari" userId="dfb708c9-d8dc-439f-9a3b-c772bf4a311c" providerId="ADAL" clId="{9C56ED94-FF08-4311-A90D-5831E9560329}" dt="2023-03-15T07:39:15.899" v="959" actId="20577"/>
+        <pc:chgData name="Matthieu De Mari" userId="dfb708c9-d8dc-439f-9a3b-c772bf4a311c" providerId="ADAL" clId="{9C56ED94-FF08-4311-A90D-5831E9560329}" dt="2023-03-21T10:14:34.806" v="4304" actId="1076"/>
         <pc:sldMkLst>
           <pc:docMk/>
           <pc:sldMk cId="1275862355" sldId="479"/>
@@ -5626,9 +5626,17 @@
             <ac:spMk id="3" creationId="{85B795C1-2C98-9E57-553C-190B7D7AEDCC}"/>
           </ac:spMkLst>
         </pc:spChg>
+        <pc:picChg chg="mod">
+          <ac:chgData name="Matthieu De Mari" userId="dfb708c9-d8dc-439f-9a3b-c772bf4a311c" providerId="ADAL" clId="{9C56ED94-FF08-4311-A90D-5831E9560329}" dt="2023-03-21T10:14:34.806" v="4304" actId="1076"/>
+          <ac:picMkLst>
+            <pc:docMk/>
+            <pc:sldMk cId="1275862355" sldId="479"/>
+            <ac:picMk id="6" creationId="{362FA86E-E2EB-114C-B1F1-D4FC16BEB206}"/>
+          </ac:picMkLst>
+        </pc:picChg>
       </pc:sldChg>
       <pc:sldChg chg="addSp delSp modSp add mod">
-        <pc:chgData name="Matthieu De Mari" userId="dfb708c9-d8dc-439f-9a3b-c772bf4a311c" providerId="ADAL" clId="{9C56ED94-FF08-4311-A90D-5831E9560329}" dt="2023-03-15T07:39:21.442" v="963" actId="20577"/>
+        <pc:chgData name="Matthieu De Mari" userId="dfb708c9-d8dc-439f-9a3b-c772bf4a311c" providerId="ADAL" clId="{9C56ED94-FF08-4311-A90D-5831E9560329}" dt="2023-03-21T10:14:42.026" v="4310" actId="1076"/>
         <pc:sldMkLst>
           <pc:docMk/>
           <pc:sldMk cId="2239257233" sldId="480"/>
@@ -5642,7 +5650,7 @@
           </ac:spMkLst>
         </pc:spChg>
         <pc:picChg chg="add mod">
-          <ac:chgData name="Matthieu De Mari" userId="dfb708c9-d8dc-439f-9a3b-c772bf4a311c" providerId="ADAL" clId="{9C56ED94-FF08-4311-A90D-5831E9560329}" dt="2023-03-15T07:38:43.907" v="952" actId="1076"/>
+          <ac:chgData name="Matthieu De Mari" userId="dfb708c9-d8dc-439f-9a3b-c772bf4a311c" providerId="ADAL" clId="{9C56ED94-FF08-4311-A90D-5831E9560329}" dt="2023-03-21T10:14:42.026" v="4310" actId="1076"/>
           <ac:picMkLst>
             <pc:docMk/>
             <pc:sldMk cId="2239257233" sldId="480"/>
@@ -5657,6 +5665,14 @@
             <ac:picMk id="6" creationId="{362FA86E-E2EB-114C-B1F1-D4FC16BEB206}"/>
           </ac:picMkLst>
         </pc:picChg>
+        <pc:picChg chg="add mod">
+          <ac:chgData name="Matthieu De Mari" userId="dfb708c9-d8dc-439f-9a3b-c772bf4a311c" providerId="ADAL" clId="{9C56ED94-FF08-4311-A90D-5831E9560329}" dt="2023-03-21T10:14:41.314" v="4309" actId="1076"/>
+          <ac:picMkLst>
+            <pc:docMk/>
+            <pc:sldMk cId="2239257233" sldId="480"/>
+            <ac:picMk id="6" creationId="{8B5D2C9A-223E-E820-EACD-F5A932485883}"/>
+          </ac:picMkLst>
+        </pc:picChg>
       </pc:sldChg>
       <pc:sldChg chg="addSp delSp modSp add mod">
         <pc:chgData name="Matthieu De Mari" userId="dfb708c9-d8dc-439f-9a3b-c772bf4a311c" providerId="ADAL" clId="{9C56ED94-FF08-4311-A90D-5831E9560329}" dt="2023-03-15T07:40:48.087" v="1126" actId="27636"/>
@@ -6446,13 +6462,13 @@
         </pc:spChg>
       </pc:sldChg>
       <pc:sldChg chg="delSp modSp add mod">
-        <pc:chgData name="Matthieu De Mari" userId="dfb708c9-d8dc-439f-9a3b-c772bf4a311c" providerId="ADAL" clId="{9C56ED94-FF08-4311-A90D-5831E9560329}" dt="2023-03-15T08:39:30.883" v="3980" actId="20577"/>
+        <pc:chgData name="Matthieu De Mari" userId="dfb708c9-d8dc-439f-9a3b-c772bf4a311c" providerId="ADAL" clId="{9C56ED94-FF08-4311-A90D-5831E9560329}" dt="2023-03-21T11:07:25.418" v="4314" actId="20577"/>
         <pc:sldMkLst>
           <pc:docMk/>
           <pc:sldMk cId="4277571336" sldId="494"/>
         </pc:sldMkLst>
         <pc:spChg chg="mod">
-          <ac:chgData name="Matthieu De Mari" userId="dfb708c9-d8dc-439f-9a3b-c772bf4a311c" providerId="ADAL" clId="{9C56ED94-FF08-4311-A90D-5831E9560329}" dt="2023-03-15T08:39:30.883" v="3980" actId="20577"/>
+          <ac:chgData name="Matthieu De Mari" userId="dfb708c9-d8dc-439f-9a3b-c772bf4a311c" providerId="ADAL" clId="{9C56ED94-FF08-4311-A90D-5831E9560329}" dt="2023-03-21T11:07:25.418" v="4314" actId="20577"/>
           <ac:spMkLst>
             <pc:docMk/>
             <pc:sldMk cId="4277571336" sldId="494"/>
@@ -8436,7 +8452,7 @@
           <a:p>
             <a:fld id="{98CFC6A4-B085-437B-8084-693BEB2A32DE}" type="datetimeFigureOut">
               <a:rPr lang="en-SG" smtClean="0"/>
-              <a:t>15/3/2023</a:t>
+              <a:t>21/3/2023</a:t>
             </a:fld>
             <a:endParaRPr lang="en-SG"/>
           </a:p>
@@ -8853,7 +8869,7 @@
           <a:p>
             <a:fld id="{AB35F6B0-D468-4997-9CE3-CF2A1AE5E3F9}" type="datetimeFigureOut">
               <a:rPr lang="en-SG" smtClean="0"/>
-              <a:t>15/3/2023</a:t>
+              <a:t>21/3/2023</a:t>
             </a:fld>
             <a:endParaRPr lang="en-SG"/>
           </a:p>
@@ -9053,7 +9069,7 @@
           <a:p>
             <a:fld id="{AB35F6B0-D468-4997-9CE3-CF2A1AE5E3F9}" type="datetimeFigureOut">
               <a:rPr lang="en-SG" smtClean="0"/>
-              <a:t>15/3/2023</a:t>
+              <a:t>21/3/2023</a:t>
             </a:fld>
             <a:endParaRPr lang="en-SG"/>
           </a:p>
@@ -9263,7 +9279,7 @@
           <a:p>
             <a:fld id="{AB35F6B0-D468-4997-9CE3-CF2A1AE5E3F9}" type="datetimeFigureOut">
               <a:rPr lang="en-SG" smtClean="0"/>
-              <a:t>15/3/2023</a:t>
+              <a:t>21/3/2023</a:t>
             </a:fld>
             <a:endParaRPr lang="en-SG"/>
           </a:p>
@@ -9463,7 +9479,7 @@
           <a:p>
             <a:fld id="{AB35F6B0-D468-4997-9CE3-CF2A1AE5E3F9}" type="datetimeFigureOut">
               <a:rPr lang="en-SG" smtClean="0"/>
-              <a:t>15/3/2023</a:t>
+              <a:t>21/3/2023</a:t>
             </a:fld>
             <a:endParaRPr lang="en-SG"/>
           </a:p>
@@ -9739,7 +9755,7 @@
           <a:p>
             <a:fld id="{AB35F6B0-D468-4997-9CE3-CF2A1AE5E3F9}" type="datetimeFigureOut">
               <a:rPr lang="en-SG" smtClean="0"/>
-              <a:t>15/3/2023</a:t>
+              <a:t>21/3/2023</a:t>
             </a:fld>
             <a:endParaRPr lang="en-SG"/>
           </a:p>
@@ -10007,7 +10023,7 @@
           <a:p>
             <a:fld id="{AB35F6B0-D468-4997-9CE3-CF2A1AE5E3F9}" type="datetimeFigureOut">
               <a:rPr lang="en-SG" smtClean="0"/>
-              <a:t>15/3/2023</a:t>
+              <a:t>21/3/2023</a:t>
             </a:fld>
             <a:endParaRPr lang="en-SG"/>
           </a:p>
@@ -10422,7 +10438,7 @@
           <a:p>
             <a:fld id="{AB35F6B0-D468-4997-9CE3-CF2A1AE5E3F9}" type="datetimeFigureOut">
               <a:rPr lang="en-SG" smtClean="0"/>
-              <a:t>15/3/2023</a:t>
+              <a:t>21/3/2023</a:t>
             </a:fld>
             <a:endParaRPr lang="en-SG"/>
           </a:p>
@@ -10564,7 +10580,7 @@
           <a:p>
             <a:fld id="{AB35F6B0-D468-4997-9CE3-CF2A1AE5E3F9}" type="datetimeFigureOut">
               <a:rPr lang="en-SG" smtClean="0"/>
-              <a:t>15/3/2023</a:t>
+              <a:t>21/3/2023</a:t>
             </a:fld>
             <a:endParaRPr lang="en-SG"/>
           </a:p>
@@ -10677,7 +10693,7 @@
           <a:p>
             <a:fld id="{AB35F6B0-D468-4997-9CE3-CF2A1AE5E3F9}" type="datetimeFigureOut">
               <a:rPr lang="en-SG" smtClean="0"/>
-              <a:t>15/3/2023</a:t>
+              <a:t>21/3/2023</a:t>
             </a:fld>
             <a:endParaRPr lang="en-SG"/>
           </a:p>
@@ -10990,7 +11006,7 @@
           <a:p>
             <a:fld id="{AB35F6B0-D468-4997-9CE3-CF2A1AE5E3F9}" type="datetimeFigureOut">
               <a:rPr lang="en-SG" smtClean="0"/>
-              <a:t>15/3/2023</a:t>
+              <a:t>21/3/2023</a:t>
             </a:fld>
             <a:endParaRPr lang="en-SG"/>
           </a:p>
@@ -11279,7 +11295,7 @@
           <a:p>
             <a:fld id="{AB35F6B0-D468-4997-9CE3-CF2A1AE5E3F9}" type="datetimeFigureOut">
               <a:rPr lang="en-SG" smtClean="0"/>
-              <a:t>15/3/2023</a:t>
+              <a:t>21/3/2023</a:t>
             </a:fld>
             <a:endParaRPr lang="en-SG"/>
           </a:p>
@@ -11522,7 +11538,7 @@
           <a:p>
             <a:fld id="{AB35F6B0-D468-4997-9CE3-CF2A1AE5E3F9}" type="datetimeFigureOut">
               <a:rPr lang="en-SG" smtClean="0"/>
-              <a:t>15/3/2023</a:t>
+              <a:t>21/3/2023</a:t>
             </a:fld>
             <a:endParaRPr lang="en-SG"/>
           </a:p>
@@ -12209,8 +12225,8 @@
           </a:p>
         </p:txBody>
       </p:sp>
-      <mc:AlternateContent xmlns:mc="http://schemas.openxmlformats.org/markup-compatibility/2006">
-        <mc:Choice xmlns:a14="http://schemas.microsoft.com/office/drawing/2010/main" Requires="a14">
+      <mc:AlternateContent xmlns:mc="http://schemas.openxmlformats.org/markup-compatibility/2006" xmlns:a14="http://schemas.microsoft.com/office/drawing/2010/main">
+        <mc:Choice Requires="a14">
           <p:sp>
             <p:nvSpPr>
               <p:cNvPr id="3" name="Content Placeholder 2">
@@ -12331,7 +12347,7 @@
             </p:txBody>
           </p:sp>
         </mc:Choice>
-        <mc:Fallback>
+        <mc:Fallback xmlns="">
           <p:sp>
             <p:nvSpPr>
               <p:cNvPr id="3" name="Content Placeholder 2">
@@ -14547,15 +14563,27 @@
             </a:pPr>
             <a:r>
               <a:rPr lang="en-GB" dirty="0"/>
-              <a:t>It is an FSM with a single stopping state, that considers as acceptable inputs any string </a:t>
-            </a:r>
-            <a:r>
-              <a:rPr lang="en-GB" i="1" dirty="0"/>
+              <a:t>It is an FSM with a single stopping state, that considers as acceptable inputs </a:t>
+            </a:r>
+            <a:r>
+              <a:rPr lang="en-GB" b="1" dirty="0"/>
+              <a:t>any string </a:t>
+            </a:r>
+            <a:r>
+              <a:rPr lang="en-GB" b="1" i="1" dirty="0"/>
               <a:t>x</a:t>
             </a:r>
             <a:r>
-              <a:rPr lang="en-GB" dirty="0"/>
-              <a:t> of 0 and 1, that have an even number of zeroes.</a:t>
+              <a:rPr lang="en-GB" b="1" dirty="0"/>
+              <a:t> of 0 and 1, that have </a:t>
+            </a:r>
+            <a:r>
+              <a:rPr lang="en-GB" b="1" u="sng" dirty="0"/>
+              <a:t>an even number of zeroes</a:t>
+            </a:r>
+            <a:r>
+              <a:rPr lang="en-GB" b="1" dirty="0"/>
+              <a:t>.</a:t>
             </a:r>
           </a:p>
           <a:p>
@@ -23761,7 +23789,7 @@
           <a:p>
             <a:r>
               <a:rPr lang="en-SG" dirty="0"/>
-              <a:t>With the exception of the state ONE ZERO and input 1, which produces an output “OK”.</a:t>
+              <a:t>With the exception of the state ONE ZERO and input 0, which produces an output “OK”.</a:t>
             </a:r>
           </a:p>
           <a:p>
@@ -31743,8 +31771,8 @@
           </a:p>
         </p:txBody>
       </p:sp>
-      <mc:AlternateContent xmlns:mc="http://schemas.openxmlformats.org/markup-compatibility/2006">
-        <mc:Choice xmlns:a14="http://schemas.microsoft.com/office/drawing/2010/main" Requires="a14">
+      <mc:AlternateContent xmlns:mc="http://schemas.openxmlformats.org/markup-compatibility/2006" xmlns:a14="http://schemas.microsoft.com/office/drawing/2010/main">
+        <mc:Choice Requires="a14">
           <p:sp>
             <p:nvSpPr>
               <p:cNvPr id="3" name="Content Placeholder 2">
@@ -31876,7 +31904,7 @@
             </p:txBody>
           </p:sp>
         </mc:Choice>
-        <mc:Fallback>
+        <mc:Fallback xmlns="">
           <p:sp>
             <p:nvSpPr>
               <p:cNvPr id="3" name="Content Placeholder 2">
@@ -32005,8 +32033,8 @@
           </a:p>
         </p:txBody>
       </p:sp>
-      <mc:AlternateContent xmlns:mc="http://schemas.openxmlformats.org/markup-compatibility/2006">
-        <mc:Choice xmlns:a14="http://schemas.microsoft.com/office/drawing/2010/main" Requires="a14">
+      <mc:AlternateContent xmlns:mc="http://schemas.openxmlformats.org/markup-compatibility/2006" xmlns:a14="http://schemas.microsoft.com/office/drawing/2010/main">
+        <mc:Choice Requires="a14">
           <p:sp>
             <p:nvSpPr>
               <p:cNvPr id="3" name="Content Placeholder 2">
@@ -32126,7 +32154,7 @@
             </p:txBody>
           </p:sp>
         </mc:Choice>
-        <mc:Fallback>
+        <mc:Fallback xmlns="">
           <p:sp>
             <p:nvSpPr>
               <p:cNvPr id="3" name="Content Placeholder 2">
@@ -32188,8 +32216,38 @@
         </p:blipFill>
         <p:spPr>
           <a:xfrm>
-            <a:off x="7543200" y="3168092"/>
+            <a:off x="7235129" y="3926950"/>
             <a:ext cx="3629532" cy="1095528"/>
+          </a:xfrm>
+          <a:prstGeom prst="rect">
+            <a:avLst/>
+          </a:prstGeom>
+        </p:spPr>
+      </p:pic>
+      <p:pic>
+        <p:nvPicPr>
+          <p:cNvPr id="6" name="Picture 5">
+            <a:extLst>
+              <a:ext uri="{FF2B5EF4-FFF2-40B4-BE49-F238E27FC236}">
+                <a16:creationId xmlns:a16="http://schemas.microsoft.com/office/drawing/2014/main" id="{8B5D2C9A-223E-E820-EACD-F5A932485883}"/>
+              </a:ext>
+            </a:extLst>
+          </p:cNvPr>
+          <p:cNvPicPr>
+            <a:picLocks noChangeAspect="1"/>
+          </p:cNvPicPr>
+          <p:nvPr/>
+        </p:nvPicPr>
+        <p:blipFill>
+          <a:blip r:embed="rId4"/>
+          <a:stretch>
+            <a:fillRect/>
+          </a:stretch>
+        </p:blipFill>
+        <p:spPr>
+          <a:xfrm>
+            <a:off x="6371616" y="2096260"/>
+            <a:ext cx="5356559" cy="1146976"/>
           </a:xfrm>
           <a:prstGeom prst="rect">
             <a:avLst/>

</xml_diff>